<commit_message>
fixes sur la présentation pédagogique sur le Réseau de Neurones
</commit_message>
<xml_diff>
--- a/TCS34725/Apprentissage pour Les pastilles.pptx
+++ b/TCS34725/Apprentissage pour Les pastilles.pptx
@@ -6338,15 +6338,7 @@
                   <a:schemeClr val="tx1"/>
                 </a:solidFill>
               </a:rPr>
-              <a:t>Les données: </a:t>
-            </a:r>
-            <a:r>
-              <a:rPr lang="fr-FR" sz="1400" dirty="0" smtClean="0">
-                <a:solidFill>
-                  <a:schemeClr val="tx1"/>
-                </a:solidFill>
-              </a:rPr>
-              <a:t>1 matrice:</a:t>
+              <a:t>Les données: 1 matrice:</a:t>
             </a:r>
           </a:p>
           <a:p>
@@ -6364,15 +6356,7 @@
                   <a:schemeClr val="tx1"/>
                 </a:solidFill>
               </a:rPr>
-              <a:t>4 colonnes x </a:t>
-            </a:r>
-            <a:r>
-              <a:rPr lang="fr-FR" sz="1400" dirty="0" smtClean="0">
-                <a:solidFill>
-                  <a:schemeClr val="tx1"/>
-                </a:solidFill>
-              </a:rPr>
-              <a:t>N lignes</a:t>
+              <a:t>4 colonnes x N lignes</a:t>
             </a:r>
           </a:p>
           <a:p>
@@ -10845,15 +10829,7 @@
                   <a:schemeClr val="tx1"/>
                 </a:solidFill>
               </a:rPr>
-              <a:t>Création </a:t>
-            </a:r>
-            <a:r>
-              <a:rPr lang="fr-FR" sz="1400" i="1" dirty="0" smtClean="0">
-                <a:solidFill>
-                  <a:schemeClr val="tx1"/>
-                </a:solidFill>
-              </a:rPr>
-              <a:t>des données</a:t>
+              <a:t>Création des données</a:t>
             </a:r>
           </a:p>
           <a:p>
@@ -10922,15 +10898,7 @@
                   <a:schemeClr val="tx1"/>
                 </a:solidFill>
               </a:rPr>
-              <a:t>Préparation des </a:t>
-            </a:r>
-            <a:r>
-              <a:rPr lang="fr-FR" sz="1400" i="1" dirty="0" smtClean="0">
-                <a:solidFill>
-                  <a:schemeClr val="tx1"/>
-                </a:solidFill>
-              </a:rPr>
-              <a:t>données</a:t>
+              <a:t>Préparation des données</a:t>
             </a:r>
           </a:p>
           <a:p>
@@ -11198,15 +11166,7 @@
                   <a:schemeClr val="tx1"/>
                 </a:solidFill>
               </a:rPr>
-              <a:t>Déclaration d’actions à effectuer durant </a:t>
-            </a:r>
-            <a:r>
-              <a:rPr lang="fr-FR" sz="1400" i="1" dirty="0" smtClean="0">
-                <a:solidFill>
-                  <a:schemeClr val="tx1"/>
-                </a:solidFill>
-              </a:rPr>
-              <a:t>l’apprentissage</a:t>
+              <a:t>Déclaration d’actions à effectuer durant l’apprentissage</a:t>
             </a:r>
           </a:p>
           <a:p>
@@ -11351,8 +11311,8 @@
         </p:nvSpPr>
         <p:spPr>
           <a:xfrm>
-            <a:off x="3854045" y="4265875"/>
-            <a:ext cx="1657522" cy="262960"/>
+            <a:off x="3854044" y="4265875"/>
+            <a:ext cx="1806427" cy="262960"/>
           </a:xfrm>
           <a:prstGeom prst="wedgeRoundRectCallout">
             <a:avLst>
@@ -11391,7 +11351,15 @@
                   <a:schemeClr val="tx1"/>
                 </a:solidFill>
               </a:rPr>
-              <a:t>Données par étape</a:t>
+              <a:t>Données par </a:t>
+            </a:r>
+            <a:r>
+              <a:rPr lang="fr-FR" sz="1400" i="1" dirty="0" smtClean="0">
+                <a:solidFill>
+                  <a:schemeClr val="tx1"/>
+                </a:solidFill>
+              </a:rPr>
+              <a:t>paquets</a:t>
             </a:r>
             <a:endParaRPr lang="fr-FR" sz="1400" i="1" dirty="0">
               <a:solidFill>
@@ -11488,7 +11456,23 @@
                   <a:schemeClr val="tx1"/>
                 </a:solidFill>
               </a:rPr>
-              <a:t>Donc, on effectue l’apprentissage par paquets de données, afin de suivre en temps réel la progression.</a:t>
+              <a:t>Donc, on effectue l’apprentissage par </a:t>
+            </a:r>
+            <a:r>
+              <a:rPr lang="fr-FR" sz="1400" i="1" dirty="0" smtClean="0">
+                <a:solidFill>
+                  <a:schemeClr val="tx1"/>
+                </a:solidFill>
+              </a:rPr>
+              <a:t>paquets de données</a:t>
+            </a:r>
+            <a:r>
+              <a:rPr lang="fr-FR" sz="1400" dirty="0" smtClean="0">
+                <a:solidFill>
+                  <a:schemeClr val="tx1"/>
+                </a:solidFill>
+              </a:rPr>
+              <a:t>, afin de suivre en temps réel la progression.</a:t>
             </a:r>
           </a:p>
           <a:p>
@@ -17443,15 +17427,7 @@
             </a:r>
             <a:r>
               <a:rPr lang="fr-FR" dirty="0" smtClean="0"/>
-              <a:t>) sur un ensemble de </a:t>
-            </a:r>
-            <a:r>
-              <a:rPr lang="fr-FR" dirty="0" smtClean="0"/>
-              <a:t>pastilles </a:t>
-            </a:r>
-            <a:r>
-              <a:rPr lang="fr-FR" dirty="0" smtClean="0"/>
-              <a:t>de couleurs</a:t>
+              <a:t>) sur un ensemble de pastilles de couleurs</a:t>
             </a:r>
           </a:p>
           <a:p>
@@ -17470,7 +17446,7 @@
                   <a:srgbClr val="C00000"/>
                 </a:solidFill>
               </a:rPr>
-              <a:t>RGB, </a:t>
+              <a:t>RGB </a:t>
             </a:r>
             <a:r>
               <a:rPr lang="fr-FR" dirty="0" smtClean="0">
@@ -17478,8 +17454,21 @@
                   <a:srgbClr val="C00000"/>
                 </a:solidFill>
               </a:rPr>
-              <a:t>telle qu’un contraste existe entre toutes les pastilles</a:t>
-            </a:r>
+              <a:t>telle qu’un contraste existe entre toutes les </a:t>
+            </a:r>
+            <a:r>
+              <a:rPr lang="fr-FR" dirty="0" smtClean="0">
+                <a:solidFill>
+                  <a:srgbClr val="C00000"/>
+                </a:solidFill>
+              </a:rPr>
+              <a:t>pastilles, permettant de bien les discriminer</a:t>
+            </a:r>
+            <a:endParaRPr lang="fr-FR" dirty="0" smtClean="0">
+              <a:solidFill>
+                <a:srgbClr val="C00000"/>
+              </a:solidFill>
+            </a:endParaRPr>
           </a:p>
           <a:p>
             <a:pPr lvl="1"/>
@@ -17497,7 +17486,7 @@
                   <a:srgbClr val="C00000"/>
                 </a:solidFill>
               </a:rPr>
-              <a:t>jeu </a:t>
+              <a:t>jeu, </a:t>
             </a:r>
             <a:r>
               <a:rPr lang="fr-FR" dirty="0" smtClean="0">
@@ -17505,7 +17494,7 @@
                   <a:srgbClr val="C00000"/>
                 </a:solidFill>
               </a:rPr>
-              <a:t>matérialisé par un véhicule-robot, est </a:t>
+              <a:t>matérialisé par un véhicule-robot, est doté d’un capteur de </a:t>
             </a:r>
             <a:r>
               <a:rPr lang="fr-FR" dirty="0" smtClean="0">
@@ -17513,8 +17502,13 @@
                   <a:srgbClr val="C00000"/>
                 </a:solidFill>
               </a:rPr>
-              <a:t>doté d’un capteur de couleur RGB</a:t>
-            </a:r>
+              <a:t>couleurs RGB (cela peut être une caméra)</a:t>
+            </a:r>
+            <a:endParaRPr lang="fr-FR" dirty="0" smtClean="0">
+              <a:solidFill>
+                <a:srgbClr val="C00000"/>
+              </a:solidFill>
+            </a:endParaRPr>
           </a:p>
           <a:p>
             <a:pPr lvl="1"/>
@@ -17540,15 +17534,7 @@
                   <a:srgbClr val="C00000"/>
                 </a:solidFill>
               </a:rPr>
-              <a:t> sera interrogé pour demander à quelle pastille correspond une valeur RGB </a:t>
-            </a:r>
-            <a:r>
-              <a:rPr lang="fr-FR" dirty="0" smtClean="0">
-                <a:solidFill>
-                  <a:srgbClr val="C00000"/>
-                </a:solidFill>
-              </a:rPr>
-              <a:t>détectée</a:t>
+              <a:t> sera interrogé pour demander à quelle pastille correspond une valeur RGB détectée</a:t>
             </a:r>
             <a:endParaRPr lang="fr-FR" dirty="0">
               <a:solidFill>
@@ -17779,7 +17765,15 @@
             </a:r>
             <a:r>
               <a:rPr lang="fr-FR" dirty="0" smtClean="0"/>
-              <a:t> les sorties des neurones aux entrées des </a:t>
+              <a:t> les sorties des </a:t>
+            </a:r>
+            <a:r>
+              <a:rPr lang="fr-FR" dirty="0" smtClean="0"/>
+              <a:t>neurones, </a:t>
+            </a:r>
+            <a:r>
+              <a:rPr lang="fr-FR" dirty="0" smtClean="0"/>
+              <a:t>aux entrées des </a:t>
             </a:r>
             <a:r>
               <a:rPr lang="fr-FR" i="1" dirty="0" smtClean="0">
@@ -18252,8 +18246,8 @@
               </a:p>
             </p:txBody>
           </p:sp>
-          <mc:AlternateContent xmlns:mc="http://schemas.openxmlformats.org/markup-compatibility/2006">
-            <mc:Choice xmlns:a14="http://schemas.microsoft.com/office/drawing/2010/main" Requires="a14">
+          <mc:AlternateContent xmlns:mc="http://schemas.openxmlformats.org/markup-compatibility/2006" xmlns:a14="http://schemas.microsoft.com/office/drawing/2010/main">
+            <mc:Choice Requires="a14">
               <p:sp>
                 <p:nvSpPr>
                   <p:cNvPr id="55" name="ZoneTexte 54"/>
@@ -18276,6 +18270,7 @@
                   </a:bodyPr>
                   <a:lstStyle/>
                   <a:p>
+                    <a:pPr/>
                     <a14:m>
                       <m:oMathPara xmlns:m="http://schemas.openxmlformats.org/officeDocument/2006/math">
                         <m:oMathParaPr>
@@ -18321,7 +18316,7 @@
                 </p:txBody>
               </p:sp>
             </mc:Choice>
-            <mc:Fallback>
+            <mc:Fallback xmlns="">
               <p:sp>
                 <p:nvSpPr>
                   <p:cNvPr id="55" name="ZoneTexte 54"/>
@@ -20861,8 +20856,8 @@
           </p:style>
         </p:cxnSp>
       </p:grpSp>
-      <mc:AlternateContent xmlns:mc="http://schemas.openxmlformats.org/markup-compatibility/2006">
-        <mc:Choice xmlns:a14="http://schemas.microsoft.com/office/drawing/2010/main" Requires="a14">
+      <mc:AlternateContent xmlns:mc="http://schemas.openxmlformats.org/markup-compatibility/2006" xmlns:a14="http://schemas.microsoft.com/office/drawing/2010/main">
+        <mc:Choice Requires="a14">
           <p:sp>
             <p:nvSpPr>
               <p:cNvPr id="69" name="ZoneTexte 68"/>
@@ -21030,7 +21025,7 @@
             </p:txBody>
           </p:sp>
         </mc:Choice>
-        <mc:Fallback>
+        <mc:Fallback xmlns="">
           <p:sp>
             <p:nvSpPr>
               <p:cNvPr id="69" name="ZoneTexte 68"/>
@@ -21088,7 +21083,7 @@
         </p:spPr>
         <p:txBody>
           <a:bodyPr vert="horz" lIns="91440" tIns="45720" rIns="91440" bIns="45720" rtlCol="0">
-            <a:normAutofit fontScale="92500" lnSpcReduction="10000"/>
+            <a:normAutofit fontScale="85000" lnSpcReduction="10000"/>
           </a:bodyPr>
           <a:lstStyle>
             <a:lvl1pPr marL="228600" indent="-228600" algn="l" defTabSz="914400" rtl="0" eaLnBrk="1" latinLnBrk="0" hangingPunct="1">
@@ -21309,6 +21304,35 @@
               </a:rPr>
               <a:t>profondes</a:t>
             </a:r>
+            <a:r>
+              <a:rPr lang="fr-FR" dirty="0" smtClean="0">
+                <a:solidFill>
+                  <a:srgbClr val="C00000"/>
+                </a:solidFill>
+              </a:rPr>
+              <a:t> (</a:t>
+            </a:r>
+            <a:r>
+              <a:rPr lang="fr-FR" i="1" dirty="0" smtClean="0">
+                <a:solidFill>
+                  <a:srgbClr val="C00000"/>
+                </a:solidFill>
+              </a:rPr>
+              <a:t>le choix dépend largement du problème considéré</a:t>
+            </a:r>
+            <a:r>
+              <a:rPr lang="fr-FR" dirty="0" smtClean="0">
+                <a:solidFill>
+                  <a:srgbClr val="C00000"/>
+                </a:solidFill>
+              </a:rPr>
+              <a:t>)</a:t>
+            </a:r>
+            <a:endParaRPr lang="fr-FR" dirty="0" smtClean="0">
+              <a:solidFill>
+                <a:srgbClr val="C00000"/>
+              </a:solidFill>
+            </a:endParaRPr>
           </a:p>
           <a:p>
             <a:pPr lvl="1"/>
@@ -21728,7 +21752,7 @@
         </p:spPr>
         <p:txBody>
           <a:bodyPr>
-            <a:normAutofit fontScale="92500" lnSpcReduction="20000"/>
+            <a:normAutofit fontScale="92500" lnSpcReduction="10000"/>
           </a:bodyPr>
           <a:lstStyle/>
           <a:p>
@@ -21738,23 +21762,7 @@
             </a:r>
             <a:r>
               <a:rPr lang="fr-FR" i="1" dirty="0" smtClean="0"/>
-              <a:t>on s’arrange que les N valeurs RGB </a:t>
-            </a:r>
-            <a:r>
-              <a:rPr lang="fr-FR" i="1" dirty="0" smtClean="0"/>
-              <a:t>soient choisies pour assurer un </a:t>
-            </a:r>
-            <a:r>
-              <a:rPr lang="fr-FR" i="1" dirty="0" smtClean="0"/>
-              <a:t>contraste entre les différentes pastilles </a:t>
-            </a:r>
-            <a:r>
-              <a:rPr lang="fr-FR" i="1" dirty="0" smtClean="0"/>
-              <a:t>mais </a:t>
-            </a:r>
-            <a:r>
-              <a:rPr lang="fr-FR" i="1" dirty="0" smtClean="0"/>
-              <a:t>aussi avec le fond</a:t>
+              <a:t>on s’arrange que les N valeurs RGB soient choisies pour assurer un contraste entre les différentes pastilles mais aussi avec le fond</a:t>
             </a:r>
             <a:r>
               <a:rPr lang="fr-FR" dirty="0" smtClean="0"/>
@@ -21771,20 +21779,11 @@
               </a:rPr>
               <a:t>Le jeu de couleurs choisi, est caractéristique de l’apprentissage. Si on change ces valeurs, l’apprentissage sera à refaire.</a:t>
             </a:r>
-            <a:endParaRPr lang="fr-FR" dirty="0" smtClean="0">
-              <a:solidFill>
-                <a:srgbClr val="C00000"/>
-              </a:solidFill>
-            </a:endParaRPr>
           </a:p>
           <a:p>
             <a:r>
               <a:rPr lang="fr-FR" dirty="0" smtClean="0"/>
-              <a:t>On prépare des données d’apprentissage </a:t>
-            </a:r>
-            <a:r>
-              <a:rPr lang="fr-FR" dirty="0" smtClean="0"/>
-              <a:t>pour décrire </a:t>
+              <a:t>On prépare des données d’apprentissage pour décrire </a:t>
             </a:r>
           </a:p>
           <a:p>
@@ -21795,14 +21794,33 @@
                   <a:srgbClr val="C00000"/>
                 </a:solidFill>
               </a:rPr>
-              <a:t>les valeurs </a:t>
-            </a:r>
+              <a:t>les valeurs RGB associées aux numéros des pastilles, </a:t>
+            </a:r>
+          </a:p>
+          <a:p>
+            <a:pPr lvl="1"/>
             <a:r>
               <a:rPr lang="fr-FR" dirty="0" smtClean="0">
                 <a:solidFill>
                   <a:srgbClr val="C00000"/>
                 </a:solidFill>
               </a:rPr>
+              <a:t>les </a:t>
+            </a:r>
+            <a:r>
+              <a:rPr lang="fr-FR" dirty="0">
+                <a:solidFill>
+                  <a:srgbClr val="C00000"/>
+                </a:solidFill>
+              </a:rPr>
+              <a:t>autres valeurs </a:t>
+            </a:r>
+            <a:r>
+              <a:rPr lang="fr-FR" dirty="0" smtClean="0">
+                <a:solidFill>
+                  <a:srgbClr val="C00000"/>
+                </a:solidFill>
+              </a:rPr>
               <a:t>RGB </a:t>
             </a:r>
             <a:r>
@@ -21811,18 +21829,23 @@
                   <a:srgbClr val="C00000"/>
                 </a:solidFill>
               </a:rPr>
-              <a:t>associées aux numéros des pastilles, </a:t>
-            </a:r>
-          </a:p>
-          <a:p>
-            <a:pPr lvl="1"/>
+              <a:t>(</a:t>
+            </a:r>
+            <a:r>
+              <a:rPr lang="fr-FR" i="1" dirty="0" smtClean="0">
+                <a:solidFill>
+                  <a:srgbClr val="C00000"/>
+                </a:solidFill>
+              </a:rPr>
+              <a:t>quelconques</a:t>
+            </a:r>
             <a:r>
               <a:rPr lang="fr-FR" dirty="0" smtClean="0">
                 <a:solidFill>
                   <a:srgbClr val="C00000"/>
                 </a:solidFill>
               </a:rPr>
-              <a:t>les valeurs </a:t>
+              <a:t>) </a:t>
             </a:r>
             <a:r>
               <a:rPr lang="fr-FR" dirty="0" smtClean="0">
@@ -21830,7 +21853,7 @@
                   <a:srgbClr val="C00000"/>
                 </a:solidFill>
               </a:rPr>
-              <a:t>RGB </a:t>
+              <a:t>qui correspondent </a:t>
             </a:r>
             <a:r>
               <a:rPr lang="fr-FR" dirty="0" smtClean="0">
@@ -21838,7 +21861,7 @@
                   <a:srgbClr val="C00000"/>
                 </a:solidFill>
               </a:rPr>
-              <a:t>autres (</a:t>
+              <a:t>au fond (</a:t>
             </a:r>
             <a:r>
               <a:rPr lang="fr-FR" i="1" dirty="0" smtClean="0">
@@ -21846,7 +21869,7 @@
                   <a:srgbClr val="C00000"/>
                 </a:solidFill>
               </a:rPr>
-              <a:t>quelconques</a:t>
+              <a:t>quel qu’il soit</a:t>
             </a:r>
             <a:r>
               <a:rPr lang="fr-FR" dirty="0" smtClean="0">
@@ -21854,29 +21877,8 @@
                   <a:srgbClr val="C00000"/>
                 </a:solidFill>
               </a:rPr>
-              <a:t>) lorsqu’elles correspondent au fond (</a:t>
-            </a:r>
-            <a:r>
-              <a:rPr lang="fr-FR" i="1" dirty="0" smtClean="0">
-                <a:solidFill>
-                  <a:srgbClr val="C00000"/>
-                </a:solidFill>
-              </a:rPr>
-              <a:t>quel qu’il soit</a:t>
-            </a:r>
-            <a:r>
-              <a:rPr lang="fr-FR" dirty="0" smtClean="0">
-                <a:solidFill>
-                  <a:srgbClr val="C00000"/>
-                </a:solidFill>
-              </a:rPr>
               <a:t>).</a:t>
             </a:r>
-            <a:endParaRPr lang="fr-FR" dirty="0" smtClean="0">
-              <a:solidFill>
-                <a:srgbClr val="C00000"/>
-              </a:solidFill>
-            </a:endParaRPr>
           </a:p>
           <a:p>
             <a:r>
@@ -21889,21 +21891,20 @@
             </a:r>
             <a:r>
               <a:rPr lang="fr-FR" dirty="0" smtClean="0"/>
-              <a:t> nécessite de </a:t>
-            </a:r>
-            <a:r>
-              <a:rPr lang="fr-FR" dirty="0" smtClean="0"/>
-              <a:t>produire deux jeux de données (</a:t>
+              <a:t> nécessite de produire deux jeux de données (</a:t>
             </a:r>
             <a:r>
               <a:rPr lang="fr-FR" i="1" dirty="0" smtClean="0"/>
-              <a:t>ayant exactement la structure</a:t>
+              <a:t>ayant exactement la </a:t>
+            </a:r>
+            <a:r>
+              <a:rPr lang="fr-FR" i="1" dirty="0" smtClean="0"/>
+              <a:t>même structure</a:t>
             </a:r>
             <a:r>
               <a:rPr lang="fr-FR" dirty="0" smtClean="0"/>
               <a:t>):</a:t>
             </a:r>
-            <a:endParaRPr lang="fr-FR" dirty="0" smtClean="0"/>
           </a:p>
           <a:p>
             <a:pPr lvl="1"/>
@@ -21913,7 +21914,18 @@
                   <a:srgbClr val="C00000"/>
                 </a:solidFill>
               </a:rPr>
-              <a:t>Un jeu pour les </a:t>
+              <a:t>Un jeu pour les données d’apprentissage</a:t>
+            </a:r>
+          </a:p>
+          <a:p>
+            <a:pPr lvl="1"/>
+            <a:r>
+              <a:rPr lang="fr-FR" dirty="0">
+                <a:solidFill>
+                  <a:srgbClr val="C00000"/>
+                </a:solidFill>
+              </a:rPr>
+              <a:t>Un jeu pour </a:t>
             </a:r>
             <a:r>
               <a:rPr lang="fr-FR" dirty="0" smtClean="0">
@@ -21921,32 +21933,8 @@
                   <a:srgbClr val="C00000"/>
                 </a:solidFill>
               </a:rPr>
-              <a:t>données d’apprentissage</a:t>
-            </a:r>
-          </a:p>
-          <a:p>
-            <a:pPr lvl="1"/>
-            <a:r>
-              <a:rPr lang="fr-FR" dirty="0">
-                <a:solidFill>
-                  <a:srgbClr val="C00000"/>
-                </a:solidFill>
-              </a:rPr>
-              <a:t>Un jeu pour </a:t>
-            </a:r>
-            <a:r>
-              <a:rPr lang="fr-FR" dirty="0" smtClean="0">
-                <a:solidFill>
-                  <a:srgbClr val="C00000"/>
-                </a:solidFill>
-              </a:rPr>
               <a:t>valider ou tester</a:t>
             </a:r>
-            <a:endParaRPr lang="fr-FR" dirty="0" smtClean="0">
-              <a:solidFill>
-                <a:srgbClr val="C00000"/>
-              </a:solidFill>
-            </a:endParaRPr>
           </a:p>
           <a:p>
             <a:pPr lvl="1"/>
@@ -22069,7 +22057,15 @@
             </a:r>
             <a:r>
               <a:rPr lang="fr-FR" dirty="0" smtClean="0"/>
-              <a:t>effective des données qui seront être réellement présentées au </a:t>
+              <a:t>effective des données qui seront </a:t>
+            </a:r>
+            <a:r>
+              <a:rPr lang="fr-FR" dirty="0" smtClean="0"/>
+              <a:t>réellement </a:t>
+            </a:r>
+            <a:r>
+              <a:rPr lang="fr-FR" dirty="0" smtClean="0"/>
+              <a:t>présentées au </a:t>
             </a:r>
             <a:r>
               <a:rPr lang="fr-FR" dirty="0" err="1" smtClean="0"/>
@@ -23375,11 +23371,6 @@
                 </a:rPr>
                 <a:t>g</a:t>
               </a:r>
-              <a:endParaRPr lang="fr-FR" sz="900" dirty="0">
-                <a:solidFill>
-                  <a:srgbClr val="00B050"/>
-                </a:solidFill>
-              </a:endParaRPr>
             </a:p>
           </p:txBody>
         </p:sp>
@@ -23740,11 +23731,6 @@
               </a:rPr>
               <a:t>Toutes les autres couleurs constituent le fond</a:t>
             </a:r>
-            <a:endParaRPr lang="fr-FR" dirty="0" smtClean="0">
-              <a:solidFill>
-                <a:srgbClr val="C00000"/>
-              </a:solidFill>
-            </a:endParaRPr>
           </a:p>
         </p:txBody>
       </p:sp>
@@ -23927,7 +23913,7 @@
           <a:p>
             <a:r>
               <a:rPr lang="fr-FR" dirty="0" smtClean="0"/>
-              <a:t>Librairies </a:t>
+              <a:t>Ce sont des librairies </a:t>
             </a:r>
             <a:r>
               <a:rPr lang="fr-FR" b="1" dirty="0" err="1" smtClean="0">
@@ -24148,7 +24134,15 @@
           <a:p>
             <a:r>
               <a:rPr lang="fr-FR" dirty="0" smtClean="0"/>
-              <a:t>On choisit N valeurs RGB telles qu’il y aura un contraste entre deux pastilles mais aussi avec un fond général (table par exemple)</a:t>
+              <a:t>On choisit N valeurs RGB telles qu’il y aura un contraste entre deux pastilles mais aussi avec un fond général </a:t>
+            </a:r>
+            <a:r>
+              <a:rPr lang="fr-FR" dirty="0" smtClean="0"/>
+              <a:t>(table </a:t>
+            </a:r>
+            <a:r>
+              <a:rPr lang="fr-FR" dirty="0" smtClean="0"/>
+              <a:t>par exemple)</a:t>
             </a:r>
           </a:p>
           <a:p>
@@ -24176,39 +24170,18 @@
                   <a:srgbClr val="C00000"/>
                 </a:solidFill>
               </a:rPr>
-              <a:t>Un gris </a:t>
-            </a:r>
+              <a:t>Un gris foncé</a:t>
+            </a:r>
+          </a:p>
+          <a:p>
+            <a:pPr lvl="1"/>
             <a:r>
               <a:rPr lang="fr-FR" dirty="0" smtClean="0">
                 <a:solidFill>
                   <a:srgbClr val="C00000"/>
                 </a:solidFill>
               </a:rPr>
-              <a:t>foncé</a:t>
-            </a:r>
-            <a:endParaRPr lang="fr-FR" dirty="0" smtClean="0">
-              <a:solidFill>
-                <a:srgbClr val="C00000"/>
-              </a:solidFill>
-            </a:endParaRPr>
-          </a:p>
-          <a:p>
-            <a:pPr lvl="1"/>
-            <a:r>
-              <a:rPr lang="fr-FR" dirty="0" smtClean="0">
-                <a:solidFill>
-                  <a:srgbClr val="C00000"/>
-                </a:solidFill>
-              </a:rPr>
-              <a:t>Un gris </a:t>
-            </a:r>
-            <a:r>
-              <a:rPr lang="fr-FR" dirty="0" smtClean="0">
-                <a:solidFill>
-                  <a:srgbClr val="C00000"/>
-                </a:solidFill>
-              </a:rPr>
-              <a:t>clair</a:t>
+              <a:t>Un gris clair</a:t>
             </a:r>
             <a:endParaRPr lang="fr-FR" dirty="0">
               <a:solidFill>
@@ -24276,17 +24249,22 @@
               <a:rPr lang="fr-FR" dirty="0" smtClean="0">
                 <a:latin typeface="Comic Sans MS" panose="030F0702030302020204" pitchFamily="66" charset="0"/>
               </a:rPr>
-              <a:t> = 0 0 </a:t>
+              <a:t> = 0 0 255           (bleu)</a:t>
+            </a:r>
+          </a:p>
+          <a:p>
+            <a:r>
+              <a:rPr lang="fr-FR" dirty="0" err="1" smtClean="0">
+                <a:latin typeface="Comic Sans MS" panose="030F0702030302020204" pitchFamily="66" charset="0"/>
+              </a:rPr>
+              <a:t>Rgb</a:t>
             </a:r>
             <a:r>
               <a:rPr lang="fr-FR" dirty="0" smtClean="0">
                 <a:latin typeface="Comic Sans MS" panose="030F0702030302020204" pitchFamily="66" charset="0"/>
               </a:rPr>
-              <a:t>255           (bleu)</a:t>
-            </a:r>
-            <a:endParaRPr lang="fr-FR" dirty="0" smtClean="0">
-              <a:latin typeface="Comic Sans MS" panose="030F0702030302020204" pitchFamily="66" charset="0"/>
-            </a:endParaRPr>
+              <a:t> = 0 255 0           (vert)</a:t>
+            </a:r>
           </a:p>
           <a:p>
             <a:r>
@@ -24299,17 +24277,22 @@
               <a:rPr lang="fr-FR" dirty="0" smtClean="0">
                 <a:latin typeface="Comic Sans MS" panose="030F0702030302020204" pitchFamily="66" charset="0"/>
               </a:rPr>
-              <a:t> = 0 255 </a:t>
+              <a:t> = 0 255 255       (cyan)</a:t>
+            </a:r>
+          </a:p>
+          <a:p>
+            <a:r>
+              <a:rPr lang="fr-FR" dirty="0" err="1" smtClean="0">
+                <a:latin typeface="Comic Sans MS" panose="030F0702030302020204" pitchFamily="66" charset="0"/>
+              </a:rPr>
+              <a:t>Rgb</a:t>
             </a:r>
             <a:r>
               <a:rPr lang="fr-FR" dirty="0" smtClean="0">
                 <a:latin typeface="Comic Sans MS" panose="030F0702030302020204" pitchFamily="66" charset="0"/>
               </a:rPr>
-              <a:t>0           (vert)</a:t>
-            </a:r>
-            <a:endParaRPr lang="fr-FR" dirty="0" smtClean="0">
-              <a:latin typeface="Comic Sans MS" panose="030F0702030302020204" pitchFamily="66" charset="0"/>
-            </a:endParaRPr>
+              <a:t> = 255 0 0           (rouge)</a:t>
+            </a:r>
           </a:p>
           <a:p>
             <a:r>
@@ -24322,86 +24305,22 @@
               <a:rPr lang="fr-FR" dirty="0" smtClean="0">
                 <a:latin typeface="Comic Sans MS" panose="030F0702030302020204" pitchFamily="66" charset="0"/>
               </a:rPr>
-              <a:t> = 0 255 </a:t>
+              <a:t> = 255 0 255       (magenta)</a:t>
+            </a:r>
+          </a:p>
+          <a:p>
+            <a:r>
+              <a:rPr lang="fr-FR" dirty="0" err="1" smtClean="0">
+                <a:latin typeface="Comic Sans MS" panose="030F0702030302020204" pitchFamily="66" charset="0"/>
+              </a:rPr>
+              <a:t>Rgb</a:t>
             </a:r>
             <a:r>
               <a:rPr lang="fr-FR" dirty="0" smtClean="0">
                 <a:latin typeface="Comic Sans MS" panose="030F0702030302020204" pitchFamily="66" charset="0"/>
               </a:rPr>
-              <a:t>255       (cyan)</a:t>
-            </a:r>
-            <a:endParaRPr lang="fr-FR" dirty="0" smtClean="0">
-              <a:latin typeface="Comic Sans MS" panose="030F0702030302020204" pitchFamily="66" charset="0"/>
-            </a:endParaRPr>
-          </a:p>
-          <a:p>
-            <a:r>
-              <a:rPr lang="fr-FR" dirty="0" err="1" smtClean="0">
-                <a:latin typeface="Comic Sans MS" panose="030F0702030302020204" pitchFamily="66" charset="0"/>
-              </a:rPr>
-              <a:t>Rgb</a:t>
-            </a:r>
-            <a:r>
-              <a:rPr lang="fr-FR" dirty="0" smtClean="0">
-                <a:latin typeface="Comic Sans MS" panose="030F0702030302020204" pitchFamily="66" charset="0"/>
-              </a:rPr>
-              <a:t> = 255 0 </a:t>
-            </a:r>
-            <a:r>
-              <a:rPr lang="fr-FR" dirty="0" smtClean="0">
-                <a:latin typeface="Comic Sans MS" panose="030F0702030302020204" pitchFamily="66" charset="0"/>
-              </a:rPr>
-              <a:t>0           (rouge)</a:t>
-            </a:r>
-            <a:endParaRPr lang="fr-FR" dirty="0" smtClean="0">
-              <a:latin typeface="Comic Sans MS" panose="030F0702030302020204" pitchFamily="66" charset="0"/>
-            </a:endParaRPr>
-          </a:p>
-          <a:p>
-            <a:r>
-              <a:rPr lang="fr-FR" dirty="0" err="1" smtClean="0">
-                <a:latin typeface="Comic Sans MS" panose="030F0702030302020204" pitchFamily="66" charset="0"/>
-              </a:rPr>
-              <a:t>Rgb</a:t>
-            </a:r>
-            <a:r>
-              <a:rPr lang="fr-FR" dirty="0" smtClean="0">
-                <a:latin typeface="Comic Sans MS" panose="030F0702030302020204" pitchFamily="66" charset="0"/>
-              </a:rPr>
-              <a:t> = 255 0 </a:t>
-            </a:r>
-            <a:r>
-              <a:rPr lang="fr-FR" dirty="0" smtClean="0">
-                <a:latin typeface="Comic Sans MS" panose="030F0702030302020204" pitchFamily="66" charset="0"/>
-              </a:rPr>
-              <a:t>255       (magenta)</a:t>
-            </a:r>
-            <a:endParaRPr lang="fr-FR" dirty="0" smtClean="0">
-              <a:latin typeface="Comic Sans MS" panose="030F0702030302020204" pitchFamily="66" charset="0"/>
-            </a:endParaRPr>
-          </a:p>
-          <a:p>
-            <a:r>
-              <a:rPr lang="fr-FR" dirty="0" err="1" smtClean="0">
-                <a:latin typeface="Comic Sans MS" panose="030F0702030302020204" pitchFamily="66" charset="0"/>
-              </a:rPr>
-              <a:t>Rgb</a:t>
-            </a:r>
-            <a:r>
-              <a:rPr lang="fr-FR" dirty="0" smtClean="0">
-                <a:latin typeface="Comic Sans MS" panose="030F0702030302020204" pitchFamily="66" charset="0"/>
-              </a:rPr>
-              <a:t> = 255 255 </a:t>
-            </a:r>
-            <a:r>
-              <a:rPr lang="fr-FR" dirty="0" smtClean="0">
-                <a:latin typeface="Comic Sans MS" panose="030F0702030302020204" pitchFamily="66" charset="0"/>
-              </a:rPr>
-              <a:t>0       (jaune)</a:t>
-            </a:r>
-            <a:endParaRPr lang="fr-FR" dirty="0" smtClean="0">
-              <a:latin typeface="Comic Sans MS" panose="030F0702030302020204" pitchFamily="66" charset="0"/>
-            </a:endParaRPr>
+              <a:t> = 255 255 0       (jaune)</a:t>
+            </a:r>
           </a:p>
           <a:p>
             <a:r>
@@ -24734,33 +24653,7 @@
                 <a:effectLst/>
                 <a:latin typeface="Consolas" panose="020B0609020204030204" pitchFamily="49" charset="0"/>
               </a:rPr>
-              <a:t>(</a:t>
-            </a:r>
-            <a:r>
-              <a:rPr kumimoji="0" lang="fr-FR" altLang="fr-FR" sz="1000" b="0" i="0" u="none" strike="noStrike" cap="none" normalizeH="0" baseline="0" dirty="0" err="1" smtClean="0">
-                <a:ln>
-                  <a:noFill/>
-                </a:ln>
-                <a:solidFill>
-                  <a:srgbClr val="000000"/>
-                </a:solidFill>
-                <a:effectLst/>
-                <a:latin typeface="Consolas" panose="020B0609020204030204" pitchFamily="49" charset="0"/>
-              </a:rPr>
-              <a:t>shape</a:t>
-            </a:r>
-            <a:r>
-              <a:rPr kumimoji="0" lang="fr-FR" altLang="fr-FR" sz="1000" b="0" i="0" u="none" strike="noStrike" cap="none" normalizeH="0" baseline="0" dirty="0" smtClean="0">
-                <a:ln>
-                  <a:noFill/>
-                </a:ln>
-                <a:solidFill>
-                  <a:srgbClr val="000000"/>
-                </a:solidFill>
-                <a:effectLst/>
-                <a:latin typeface="Consolas" panose="020B0609020204030204" pitchFamily="49" charset="0"/>
-              </a:rPr>
-              <a:t>, </a:t>
+              <a:t>(3, </a:t>
             </a:r>
             <a:r>
               <a:rPr kumimoji="0" lang="fr-FR" altLang="fr-FR" sz="1000" b="0" i="0" u="none" strike="noStrike" cap="none" normalizeH="0" baseline="0" dirty="0" err="1" smtClean="0">

</xml_diff>